<commit_message>
Correção da logo do PITCH
</commit_message>
<xml_diff>
--- a/PastaDocumentos/PITCH.pptx
+++ b/PastaDocumentos/PITCH.pptx
@@ -126,16 +126,249 @@
           <inkml:channelProperty channel="Y" name="resolution" value="1000" units="1/cm"/>
         </inkml:channelProperties>
       </inkml:inkSource>
-      <inkml:timestamp xml:id="ts0" timeString="2024-03-21T12:28:16.132"/>
+      <inkml:timestamp xml:id="ts0" timeString="2024-03-21T12:35:44.006"/>
     </inkml:context>
     <inkml:brush xml:id="br0">
       <inkml:brushProperty name="width" value="0.05" units="cm"/>
       <inkml:brushProperty name="height" value="0.05" units="cm"/>
-      <inkml:brushProperty name="color" value="#E71224"/>
       <inkml:brushProperty name="ignorePressure" value="1"/>
     </inkml:brush>
   </inkml:definitions>
-  <inkml:trace contextRef="#ctx0" brushRef="#br0">9312 0,'186'0,"2257"20,1013 136,-3030-128,92 26,-501-51,1 0,-2 1,30 10,-46-14,1 0,-1 0,0 0,1 0,-1 1,0-1,1 0,-1 0,0 0,1 0,-1 1,0-1,1 0,-1 0,0 1,0-1,1 0,-1 0,0 1,0-1,0 0,1 1,-1-1,0 0,0 1,0-1,0 0,0 1,0-1,0 1,0-1,0 0,0 1,0-1,0 0,0 1,0-1,0 0,0 1,-21 11,-20-3,-52 7,-192 20,-172 18,-211 23,-222 23,-189 20,-148 2,-4897 418,5318-476,215-22,11-6,763-64,178-10,175-7,155 0,119 4,3860-35,-4523 78,-126 1,-32 1,-248 10,184-13,-1084 16,-747 29,1838-44,37-2,0 2,0 1,0 1,-31 9,62-13,0-1,0 1,0 0,0 0,0 0,-1 0,1 0,0 0,0 0,0 0,0 0,0 0,-1 0,1 0,0 0,0 0,0 0,0 0,0 0,-1 0,1 0,0 0,0 0,0 0,0 0,0 0,0 0,-1 0,1 0,0 1,0-1,0 0,0 0,0 0,0 0,0 0,-1 0,1 0,0 1,0-1,0 0,0 0,0 0,0 0,0 0,0 0,0 1,0-1,0 0,0 0,0 0,0 0,0 0,0 1,0-1,0 0,0 0,0 0,0 0,0 0,0 1,0-1,0 0,0 0,1 0,-1 0,0 0,21 3,52-7,133-23,-87 9,300-46,131-25,3326-626,-4425 803,6-20,-167-2,-146-5,-124-11,-4250 53,5132-103,26 0,196-3,294-9,274-10,240-10,169-11,3244-142,-3651 151,-220 4,-218 6,-209 14,-44 7,-13 1,-172 8,-222 27,-230 28,-213 29,-190 23,-166 18,-139 18,-3976 483,4465-522,303-32,477-67,-101 27,158-29,15-8,1-1,0 0,0 0,0 0,0 0,-1 0,1 1,0-1,0 0,0 0,0 0,0 1,0-1,0 0,0 0,0 1,0-1,0 0,0 0,0 0,0 1,0-1,0 0,0 0,0 0,0 1,0-1,0 0,0 0,0 0,0 1,0-1,0 0,1 0,-1 0,0 1,0-1,0 0,0 0,0 0,1 0,-1 1,5 1,1 1,-1-1,1 0,-1-1,1 1,0-1,7 0,297 27,297 2,295-3,245-8,168-23,65-33,-62-28,-176-19,-233-5,-257 7,-248 16,-342 54,68-22,-99 17,-30 17,-1 0,0 0,0 0,1-1,-1 1,0 0,0 0,0-1,0 1,0 0,1-1,-1 1,0 0,0 0,0-1,0 1,0 0,0-1,0 1,0 0,0-1,0 1,0 0,0-1,0 1,-1 0,1 0,0-1,0 1,0 0,0-1,0 1,-1 0,1 0,0-1,0 1,0 0,-1 0,1 0,0-1,0 1,-1 0,1 0,0 0,0 0,-1 0,1-1,0 1,-1 0,-11-4,0 1,0 1,0-1,-1 2,-15-1,-666 3,589 3,18-1</inkml:trace>
+  <inkml:trace contextRef="#ctx0" brushRef="#br0">0 1,'0'0</inkml:trace>
+</inkml:ink>
+</file>
+
+<file path=ppt/ink/ink10.xml><?xml version="1.0" encoding="utf-8"?>
+<inkml:ink xmlns:inkml="http://www.w3.org/2003/InkML">
+  <inkml:definitions>
+    <inkml:context xml:id="ctx0">
+      <inkml:inkSource xml:id="inkSrc0">
+        <inkml:traceFormat>
+          <inkml:channel name="X" type="integer" min="-2.14748E9" max="2.14748E9" units="cm"/>
+          <inkml:channel name="Y" type="integer" min="-2.14748E9" max="2.14748E9" units="cm"/>
+        </inkml:traceFormat>
+        <inkml:channelProperties>
+          <inkml:channelProperty channel="X" name="resolution" value="1000" units="1/cm"/>
+          <inkml:channelProperty channel="Y" name="resolution" value="1000" units="1/cm"/>
+        </inkml:channelProperties>
+      </inkml:inkSource>
+      <inkml:timestamp xml:id="ts0" timeString="2024-03-21T12:35:50.405"/>
+    </inkml:context>
+    <inkml:brush xml:id="br0">
+      <inkml:brushProperty name="width" value="0.05" units="cm"/>
+      <inkml:brushProperty name="height" value="0.05" units="cm"/>
+      <inkml:brushProperty name="ignorePressure" value="1"/>
+    </inkml:brush>
+  </inkml:definitions>
+  <inkml:trace contextRef="#ctx0" brushRef="#br0">1 1,'0'0</inkml:trace>
+</inkml:ink>
+</file>
+
+<file path=ppt/ink/ink2.xml><?xml version="1.0" encoding="utf-8"?>
+<inkml:ink xmlns:inkml="http://www.w3.org/2003/InkML">
+  <inkml:definitions>
+    <inkml:context xml:id="ctx0">
+      <inkml:inkSource xml:id="inkSrc0">
+        <inkml:traceFormat>
+          <inkml:channel name="X" type="integer" min="-2.14748E9" max="2.14748E9" units="cm"/>
+          <inkml:channel name="Y" type="integer" min="-2.14748E9" max="2.14748E9" units="cm"/>
+        </inkml:traceFormat>
+        <inkml:channelProperties>
+          <inkml:channelProperty channel="X" name="resolution" value="1000" units="1/cm"/>
+          <inkml:channelProperty channel="Y" name="resolution" value="1000" units="1/cm"/>
+        </inkml:channelProperties>
+      </inkml:inkSource>
+      <inkml:timestamp xml:id="ts0" timeString="2024-03-21T12:35:44.506"/>
+    </inkml:context>
+    <inkml:brush xml:id="br0">
+      <inkml:brushProperty name="width" value="0.05" units="cm"/>
+      <inkml:brushProperty name="height" value="0.05" units="cm"/>
+      <inkml:brushProperty name="ignorePressure" value="1"/>
+    </inkml:brush>
+  </inkml:definitions>
+  <inkml:trace contextRef="#ctx0" brushRef="#br0">0 1,'0'0</inkml:trace>
+</inkml:ink>
+</file>
+
+<file path=ppt/ink/ink3.xml><?xml version="1.0" encoding="utf-8"?>
+<inkml:ink xmlns:inkml="http://www.w3.org/2003/InkML">
+  <inkml:definitions>
+    <inkml:context xml:id="ctx0">
+      <inkml:inkSource xml:id="inkSrc0">
+        <inkml:traceFormat>
+          <inkml:channel name="X" type="integer" min="-2.14748E9" max="2.14748E9" units="cm"/>
+          <inkml:channel name="Y" type="integer" min="-2.14748E9" max="2.14748E9" units="cm"/>
+        </inkml:traceFormat>
+        <inkml:channelProperties>
+          <inkml:channelProperty channel="X" name="resolution" value="1000" units="1/cm"/>
+          <inkml:channelProperty channel="Y" name="resolution" value="1000" units="1/cm"/>
+        </inkml:channelProperties>
+      </inkml:inkSource>
+      <inkml:timestamp xml:id="ts0" timeString="2024-03-21T12:35:47.686"/>
+    </inkml:context>
+    <inkml:brush xml:id="br0">
+      <inkml:brushProperty name="width" value="0.05" units="cm"/>
+      <inkml:brushProperty name="height" value="0.05" units="cm"/>
+      <inkml:brushProperty name="ignorePressure" value="1"/>
+    </inkml:brush>
+  </inkml:definitions>
+  <inkml:trace contextRef="#ctx0" brushRef="#br0">0 1,'0'0</inkml:trace>
+</inkml:ink>
+</file>
+
+<file path=ppt/ink/ink4.xml><?xml version="1.0" encoding="utf-8"?>
+<inkml:ink xmlns:inkml="http://www.w3.org/2003/InkML">
+  <inkml:definitions>
+    <inkml:context xml:id="ctx0">
+      <inkml:inkSource xml:id="inkSrc0">
+        <inkml:traceFormat>
+          <inkml:channel name="X" type="integer" min="-2.14748E9" max="2.14748E9" units="cm"/>
+          <inkml:channel name="Y" type="integer" min="-2.14748E9" max="2.14748E9" units="cm"/>
+        </inkml:traceFormat>
+        <inkml:channelProperties>
+          <inkml:channelProperty channel="X" name="resolution" value="1000" units="1/cm"/>
+          <inkml:channelProperty channel="Y" name="resolution" value="1000" units="1/cm"/>
+        </inkml:channelProperties>
+      </inkml:inkSource>
+      <inkml:timestamp xml:id="ts0" timeString="2024-03-21T12:35:48.155"/>
+    </inkml:context>
+    <inkml:brush xml:id="br0">
+      <inkml:brushProperty name="width" value="0.05" units="cm"/>
+      <inkml:brushProperty name="height" value="0.05" units="cm"/>
+      <inkml:brushProperty name="ignorePressure" value="1"/>
+    </inkml:brush>
+  </inkml:definitions>
+  <inkml:trace contextRef="#ctx0" brushRef="#br0">1 0,'0'0</inkml:trace>
+</inkml:ink>
+</file>
+
+<file path=ppt/ink/ink5.xml><?xml version="1.0" encoding="utf-8"?>
+<inkml:ink xmlns:inkml="http://www.w3.org/2003/InkML">
+  <inkml:definitions>
+    <inkml:context xml:id="ctx0">
+      <inkml:inkSource xml:id="inkSrc0">
+        <inkml:traceFormat>
+          <inkml:channel name="X" type="integer" min="-2.14748E9" max="2.14748E9" units="cm"/>
+          <inkml:channel name="Y" type="integer" min="-2.14748E9" max="2.14748E9" units="cm"/>
+        </inkml:traceFormat>
+        <inkml:channelProperties>
+          <inkml:channelProperty channel="X" name="resolution" value="1000" units="1/cm"/>
+          <inkml:channelProperty channel="Y" name="resolution" value="1000" units="1/cm"/>
+        </inkml:channelProperties>
+      </inkml:inkSource>
+      <inkml:timestamp xml:id="ts0" timeString="2024-03-21T12:35:48.525"/>
+    </inkml:context>
+    <inkml:brush xml:id="br0">
+      <inkml:brushProperty name="width" value="0.05" units="cm"/>
+      <inkml:brushProperty name="height" value="0.05" units="cm"/>
+      <inkml:brushProperty name="ignorePressure" value="1"/>
+    </inkml:brush>
+  </inkml:definitions>
+  <inkml:trace contextRef="#ctx0" brushRef="#br0">1 1,'0'0</inkml:trace>
+</inkml:ink>
+</file>
+
+<file path=ppt/ink/ink6.xml><?xml version="1.0" encoding="utf-8"?>
+<inkml:ink xmlns:inkml="http://www.w3.org/2003/InkML">
+  <inkml:definitions>
+    <inkml:context xml:id="ctx0">
+      <inkml:inkSource xml:id="inkSrc0">
+        <inkml:traceFormat>
+          <inkml:channel name="X" type="integer" min="-2.14748E9" max="2.14748E9" units="cm"/>
+          <inkml:channel name="Y" type="integer" min="-2.14748E9" max="2.14748E9" units="cm"/>
+        </inkml:traceFormat>
+        <inkml:channelProperties>
+          <inkml:channelProperty channel="X" name="resolution" value="1000" units="1/cm"/>
+          <inkml:channelProperty channel="Y" name="resolution" value="1000" units="1/cm"/>
+        </inkml:channelProperties>
+      </inkml:inkSource>
+      <inkml:timestamp xml:id="ts0" timeString="2024-03-21T12:35:49.056"/>
+    </inkml:context>
+    <inkml:brush xml:id="br0">
+      <inkml:brushProperty name="width" value="0.05" units="cm"/>
+      <inkml:brushProperty name="height" value="0.05" units="cm"/>
+      <inkml:brushProperty name="ignorePressure" value="1"/>
+    </inkml:brush>
+  </inkml:definitions>
+  <inkml:trace contextRef="#ctx0" brushRef="#br0">12 1,'-5'0,"-2"0</inkml:trace>
+</inkml:ink>
+</file>
+
+<file path=ppt/ink/ink7.xml><?xml version="1.0" encoding="utf-8"?>
+<inkml:ink xmlns:inkml="http://www.w3.org/2003/InkML">
+  <inkml:definitions>
+    <inkml:context xml:id="ctx0">
+      <inkml:inkSource xml:id="inkSrc0">
+        <inkml:traceFormat>
+          <inkml:channel name="X" type="integer" min="-2.14748E9" max="2.14748E9" units="cm"/>
+          <inkml:channel name="Y" type="integer" min="-2.14748E9" max="2.14748E9" units="cm"/>
+        </inkml:traceFormat>
+        <inkml:channelProperties>
+          <inkml:channelProperty channel="X" name="resolution" value="1000" units="1/cm"/>
+          <inkml:channelProperty channel="Y" name="resolution" value="1000" units="1/cm"/>
+        </inkml:channelProperties>
+      </inkml:inkSource>
+      <inkml:timestamp xml:id="ts0" timeString="2024-03-21T12:35:49.410"/>
+    </inkml:context>
+    <inkml:brush xml:id="br0">
+      <inkml:brushProperty name="width" value="0.05" units="cm"/>
+      <inkml:brushProperty name="height" value="0.05" units="cm"/>
+      <inkml:brushProperty name="ignorePressure" value="1"/>
+    </inkml:brush>
+  </inkml:definitions>
+  <inkml:trace contextRef="#ctx0" brushRef="#br0">1 1,'0'0</inkml:trace>
+</inkml:ink>
+</file>
+
+<file path=ppt/ink/ink8.xml><?xml version="1.0" encoding="utf-8"?>
+<inkml:ink xmlns:inkml="http://www.w3.org/2003/InkML">
+  <inkml:definitions>
+    <inkml:context xml:id="ctx0">
+      <inkml:inkSource xml:id="inkSrc0">
+        <inkml:traceFormat>
+          <inkml:channel name="X" type="integer" min="-2.14748E9" max="2.14748E9" units="cm"/>
+          <inkml:channel name="Y" type="integer" min="-2.14748E9" max="2.14748E9" units="cm"/>
+        </inkml:traceFormat>
+        <inkml:channelProperties>
+          <inkml:channelProperty channel="X" name="resolution" value="1000" units="1/cm"/>
+          <inkml:channelProperty channel="Y" name="resolution" value="1000" units="1/cm"/>
+        </inkml:channelProperties>
+      </inkml:inkSource>
+      <inkml:timestamp xml:id="ts0" timeString="2024-03-21T12:35:49.738"/>
+    </inkml:context>
+    <inkml:brush xml:id="br0">
+      <inkml:brushProperty name="width" value="0.05" units="cm"/>
+      <inkml:brushProperty name="height" value="0.05" units="cm"/>
+      <inkml:brushProperty name="ignorePressure" value="1"/>
+    </inkml:brush>
+  </inkml:definitions>
+  <inkml:trace contextRef="#ctx0" brushRef="#br0">13 424,'0'-69,"-6"-98,-1-20</inkml:trace>
+</inkml:ink>
+</file>
+
+<file path=ppt/ink/ink9.xml><?xml version="1.0" encoding="utf-8"?>
+<inkml:ink xmlns:inkml="http://www.w3.org/2003/InkML">
+  <inkml:definitions>
+    <inkml:context xml:id="ctx0">
+      <inkml:inkSource xml:id="inkSrc0">
+        <inkml:traceFormat>
+          <inkml:channel name="X" type="integer" min="-2.14748E9" max="2.14748E9" units="cm"/>
+          <inkml:channel name="Y" type="integer" min="-2.14748E9" max="2.14748E9" units="cm"/>
+        </inkml:traceFormat>
+        <inkml:channelProperties>
+          <inkml:channelProperty channel="X" name="resolution" value="1000" units="1/cm"/>
+          <inkml:channelProperty channel="Y" name="resolution" value="1000" units="1/cm"/>
+        </inkml:channelProperties>
+      </inkml:inkSource>
+      <inkml:timestamp xml:id="ts0" timeString="2024-03-21T12:35:50.066"/>
+    </inkml:context>
+    <inkml:brush xml:id="br0">
+      <inkml:brushProperty name="width" value="0.05" units="cm"/>
+      <inkml:brushProperty name="height" value="0.05" units="cm"/>
+      <inkml:brushProperty name="ignorePressure" value="1"/>
+    </inkml:brush>
+  </inkml:definitions>
+  <inkml:trace contextRef="#ctx0" brushRef="#br0">0 0,'0'0</inkml:trace>
 </inkml:ink>
 </file>
 
@@ -3410,12 +3643,26 @@
           </a:xfrm>
         </p:spPr>
         <p:txBody>
-          <a:bodyPr/>
+          <a:bodyPr>
+            <a:normAutofit lnSpcReduction="10000"/>
+          </a:bodyPr>
           <a:lstStyle/>
           <a:p>
             <a:r>
               <a:rPr lang="pt-BR" dirty="0"/>
               <a:t>PITCH</a:t>
+            </a:r>
+          </a:p>
+          <a:p>
+            <a:endParaRPr lang="pt-BR"/>
+          </a:p>
+          <a:p>
+            <a:br>
+              <a:rPr lang="pt-BR" dirty="0"/>
+            </a:br>
+            <a:r>
+              <a:rPr lang="pt-BR"/>
+              <a:t>Agora sim</a:t>
             </a:r>
             <a:endParaRPr lang="en-US" dirty="0"/>
           </a:p>
@@ -3428,7 +3675,7 @@
               <p14:cNvPr id="4" name="Ink 3">
                 <a:extLst>
                   <a:ext uri="{FF2B5EF4-FFF2-40B4-BE49-F238E27FC236}">
-                    <a16:creationId xmlns:a16="http://schemas.microsoft.com/office/drawing/2014/main" id="{947FF009-34EB-4DFB-A415-F3D9230BDB64}"/>
+                    <a16:creationId xmlns:a16="http://schemas.microsoft.com/office/drawing/2014/main" id="{E4EBFA3F-5114-4DD4-B081-F814F65C2FC1}"/>
                   </a:ext>
                 </a:extLst>
               </p14:cNvPr>
@@ -3436,8 +3683,8 @@
               <p14:nvPr/>
             </p14:nvContentPartPr>
             <p14:xfrm>
-              <a:off x="3071018" y="733676"/>
-              <a:ext cx="5920560" cy="746640"/>
+              <a:off x="6152258" y="4402076"/>
+              <a:ext cx="360" cy="360"/>
             </p14:xfrm>
           </p:contentPart>
         </mc:Choice>
@@ -3447,7 +3694,7 @@
               <p:cNvPr id="4" name="Ink 3">
                 <a:extLst>
                   <a:ext uri="{FF2B5EF4-FFF2-40B4-BE49-F238E27FC236}">
-                    <a16:creationId xmlns:a16="http://schemas.microsoft.com/office/drawing/2014/main" id="{947FF009-34EB-4DFB-A415-F3D9230BDB64}"/>
+                    <a16:creationId xmlns:a16="http://schemas.microsoft.com/office/drawing/2014/main" id="{E4EBFA3F-5114-4DD4-B081-F814F65C2FC1}"/>
                   </a:ext>
                 </a:extLst>
               </p:cNvPr>
@@ -3462,8 +3709,488 @@
             </p:blipFill>
             <p:spPr>
               <a:xfrm>
-                <a:off x="3062378" y="724676"/>
-                <a:ext cx="5938200" cy="764280"/>
+                <a:off x="6143258" y="4393436"/>
+                <a:ext cx="18000" cy="18000"/>
+              </a:xfrm>
+              <a:prstGeom prst="rect">
+                <a:avLst/>
+              </a:prstGeom>
+            </p:spPr>
+          </p:pic>
+        </mc:Fallback>
+      </mc:AlternateContent>
+      <mc:AlternateContent xmlns:mc="http://schemas.openxmlformats.org/markup-compatibility/2006">
+        <mc:Choice xmlns:p14="http://schemas.microsoft.com/office/powerpoint/2010/main" Requires="p14">
+          <p:contentPart p14:bwMode="auto" r:id="rId4">
+            <p14:nvContentPartPr>
+              <p14:cNvPr id="5" name="Ink 4">
+                <a:extLst>
+                  <a:ext uri="{FF2B5EF4-FFF2-40B4-BE49-F238E27FC236}">
+                    <a16:creationId xmlns:a16="http://schemas.microsoft.com/office/drawing/2014/main" id="{1463F0AC-FF94-4E52-9D70-732AB7F747CF}"/>
+                  </a:ext>
+                </a:extLst>
+              </p14:cNvPr>
+              <p14:cNvContentPartPr/>
+              <p14:nvPr/>
+            </p14:nvContentPartPr>
+            <p14:xfrm>
+              <a:off x="6840938" y="4199036"/>
+              <a:ext cx="360" cy="360"/>
+            </p14:xfrm>
+          </p:contentPart>
+        </mc:Choice>
+        <mc:Fallback>
+          <p:pic>
+            <p:nvPicPr>
+              <p:cNvPr id="5" name="Ink 4">
+                <a:extLst>
+                  <a:ext uri="{FF2B5EF4-FFF2-40B4-BE49-F238E27FC236}">
+                    <a16:creationId xmlns:a16="http://schemas.microsoft.com/office/drawing/2014/main" id="{1463F0AC-FF94-4E52-9D70-732AB7F747CF}"/>
+                  </a:ext>
+                </a:extLst>
+              </p:cNvPr>
+              <p:cNvPicPr/>
+              <p:nvPr/>
+            </p:nvPicPr>
+            <p:blipFill>
+              <a:blip r:embed="rId3"/>
+              <a:stretch>
+                <a:fillRect/>
+              </a:stretch>
+            </p:blipFill>
+            <p:spPr>
+              <a:xfrm>
+                <a:off x="6831938" y="4190396"/>
+                <a:ext cx="18000" cy="18000"/>
+              </a:xfrm>
+              <a:prstGeom prst="rect">
+                <a:avLst/>
+              </a:prstGeom>
+            </p:spPr>
+          </p:pic>
+        </mc:Fallback>
+      </mc:AlternateContent>
+      <mc:AlternateContent xmlns:mc="http://schemas.openxmlformats.org/markup-compatibility/2006">
+        <mc:Choice xmlns:p14="http://schemas.microsoft.com/office/powerpoint/2010/main" Requires="p14">
+          <p:contentPart p14:bwMode="auto" r:id="rId5">
+            <p14:nvContentPartPr>
+              <p14:cNvPr id="6" name="Ink 5">
+                <a:extLst>
+                  <a:ext uri="{FF2B5EF4-FFF2-40B4-BE49-F238E27FC236}">
+                    <a16:creationId xmlns:a16="http://schemas.microsoft.com/office/drawing/2014/main" id="{BEE939FD-163C-4302-8C1A-9D3A068565AE}"/>
+                  </a:ext>
+                </a:extLst>
+              </p14:cNvPr>
+              <p14:cNvContentPartPr/>
+              <p14:nvPr/>
+            </p14:nvContentPartPr>
+            <p14:xfrm>
+              <a:off x="5779658" y="4074836"/>
+              <a:ext cx="360" cy="360"/>
+            </p14:xfrm>
+          </p:contentPart>
+        </mc:Choice>
+        <mc:Fallback>
+          <p:pic>
+            <p:nvPicPr>
+              <p:cNvPr id="6" name="Ink 5">
+                <a:extLst>
+                  <a:ext uri="{FF2B5EF4-FFF2-40B4-BE49-F238E27FC236}">
+                    <a16:creationId xmlns:a16="http://schemas.microsoft.com/office/drawing/2014/main" id="{BEE939FD-163C-4302-8C1A-9D3A068565AE}"/>
+                  </a:ext>
+                </a:extLst>
+              </p:cNvPr>
+              <p:cNvPicPr/>
+              <p:nvPr/>
+            </p:nvPicPr>
+            <p:blipFill>
+              <a:blip r:embed="rId3"/>
+              <a:stretch>
+                <a:fillRect/>
+              </a:stretch>
+            </p:blipFill>
+            <p:spPr>
+              <a:xfrm>
+                <a:off x="5770658" y="4066196"/>
+                <a:ext cx="18000" cy="18000"/>
+              </a:xfrm>
+              <a:prstGeom prst="rect">
+                <a:avLst/>
+              </a:prstGeom>
+            </p:spPr>
+          </p:pic>
+        </mc:Fallback>
+      </mc:AlternateContent>
+      <mc:AlternateContent xmlns:mc="http://schemas.openxmlformats.org/markup-compatibility/2006">
+        <mc:Choice xmlns:p14="http://schemas.microsoft.com/office/powerpoint/2010/main" Requires="p14">
+          <p:contentPart p14:bwMode="auto" r:id="rId6">
+            <p14:nvContentPartPr>
+              <p14:cNvPr id="7" name="Ink 6">
+                <a:extLst>
+                  <a:ext uri="{FF2B5EF4-FFF2-40B4-BE49-F238E27FC236}">
+                    <a16:creationId xmlns:a16="http://schemas.microsoft.com/office/drawing/2014/main" id="{694D95AB-6BC6-44CE-A2CC-D9F5FF962DC3}"/>
+                  </a:ext>
+                </a:extLst>
+              </p14:cNvPr>
+              <p14:cNvContentPartPr/>
+              <p14:nvPr/>
+            </p14:nvContentPartPr>
+            <p14:xfrm>
+              <a:off x="6073058" y="3928316"/>
+              <a:ext cx="360" cy="360"/>
+            </p14:xfrm>
+          </p:contentPart>
+        </mc:Choice>
+        <mc:Fallback>
+          <p:pic>
+            <p:nvPicPr>
+              <p:cNvPr id="7" name="Ink 6">
+                <a:extLst>
+                  <a:ext uri="{FF2B5EF4-FFF2-40B4-BE49-F238E27FC236}">
+                    <a16:creationId xmlns:a16="http://schemas.microsoft.com/office/drawing/2014/main" id="{694D95AB-6BC6-44CE-A2CC-D9F5FF962DC3}"/>
+                  </a:ext>
+                </a:extLst>
+              </p:cNvPr>
+              <p:cNvPicPr/>
+              <p:nvPr/>
+            </p:nvPicPr>
+            <p:blipFill>
+              <a:blip r:embed="rId3"/>
+              <a:stretch>
+                <a:fillRect/>
+              </a:stretch>
+            </p:blipFill>
+            <p:spPr>
+              <a:xfrm>
+                <a:off x="6064418" y="3919316"/>
+                <a:ext cx="18000" cy="18000"/>
+              </a:xfrm>
+              <a:prstGeom prst="rect">
+                <a:avLst/>
+              </a:prstGeom>
+            </p:spPr>
+          </p:pic>
+        </mc:Fallback>
+      </mc:AlternateContent>
+      <mc:AlternateContent xmlns:mc="http://schemas.openxmlformats.org/markup-compatibility/2006">
+        <mc:Choice xmlns:p14="http://schemas.microsoft.com/office/powerpoint/2010/main" Requires="p14">
+          <p:contentPart p14:bwMode="auto" r:id="rId7">
+            <p14:nvContentPartPr>
+              <p14:cNvPr id="8" name="Ink 7">
+                <a:extLst>
+                  <a:ext uri="{FF2B5EF4-FFF2-40B4-BE49-F238E27FC236}">
+                    <a16:creationId xmlns:a16="http://schemas.microsoft.com/office/drawing/2014/main" id="{DDE34E3A-942A-4EE3-8108-19D4BB274F17}"/>
+                  </a:ext>
+                </a:extLst>
+              </p14:cNvPr>
+              <p14:cNvContentPartPr/>
+              <p14:nvPr/>
+            </p14:nvContentPartPr>
+            <p14:xfrm>
+              <a:off x="6185738" y="3273476"/>
+              <a:ext cx="360" cy="360"/>
+            </p14:xfrm>
+          </p:contentPart>
+        </mc:Choice>
+        <mc:Fallback>
+          <p:pic>
+            <p:nvPicPr>
+              <p:cNvPr id="8" name="Ink 7">
+                <a:extLst>
+                  <a:ext uri="{FF2B5EF4-FFF2-40B4-BE49-F238E27FC236}">
+                    <a16:creationId xmlns:a16="http://schemas.microsoft.com/office/drawing/2014/main" id="{DDE34E3A-942A-4EE3-8108-19D4BB274F17}"/>
+                  </a:ext>
+                </a:extLst>
+              </p:cNvPr>
+              <p:cNvPicPr/>
+              <p:nvPr/>
+            </p:nvPicPr>
+            <p:blipFill>
+              <a:blip r:embed="rId3"/>
+              <a:stretch>
+                <a:fillRect/>
+              </a:stretch>
+            </p:blipFill>
+            <p:spPr>
+              <a:xfrm>
+                <a:off x="6177098" y="3264836"/>
+                <a:ext cx="18000" cy="18000"/>
+              </a:xfrm>
+              <a:prstGeom prst="rect">
+                <a:avLst/>
+              </a:prstGeom>
+            </p:spPr>
+          </p:pic>
+        </mc:Fallback>
+      </mc:AlternateContent>
+      <p:grpSp>
+        <p:nvGrpSpPr>
+          <p:cNvPr id="14" name="Group 13">
+            <a:extLst>
+              <a:ext uri="{FF2B5EF4-FFF2-40B4-BE49-F238E27FC236}">
+                <a16:creationId xmlns:a16="http://schemas.microsoft.com/office/drawing/2014/main" id="{2BA4A618-480F-44FD-BE57-45F12D3DBD58}"/>
+              </a:ext>
+            </a:extLst>
+          </p:cNvPr>
+          <p:cNvGrpSpPr/>
+          <p:nvPr/>
+        </p:nvGrpSpPr>
+        <p:grpSpPr>
+          <a:xfrm>
+            <a:off x="5542418" y="3668756"/>
+            <a:ext cx="23040" cy="360"/>
+            <a:chOff x="5542418" y="3668756"/>
+            <a:chExt cx="23040" cy="360"/>
+          </a:xfrm>
+        </p:grpSpPr>
+        <mc:AlternateContent xmlns:mc="http://schemas.openxmlformats.org/markup-compatibility/2006">
+          <mc:Choice xmlns:p14="http://schemas.microsoft.com/office/powerpoint/2010/main" Requires="p14">
+            <p:contentPart p14:bwMode="auto" r:id="rId8">
+              <p14:nvContentPartPr>
+                <p14:cNvPr id="9" name="Ink 8">
+                  <a:extLst>
+                    <a:ext uri="{FF2B5EF4-FFF2-40B4-BE49-F238E27FC236}">
+                      <a16:creationId xmlns:a16="http://schemas.microsoft.com/office/drawing/2014/main" id="{3FBCFF8B-2DFE-4208-8DD2-B28957F4FF96}"/>
+                    </a:ext>
+                  </a:extLst>
+                </p14:cNvPr>
+                <p14:cNvContentPartPr/>
+                <p14:nvPr/>
+              </p14:nvContentPartPr>
+              <p14:xfrm>
+                <a:off x="5560778" y="3668756"/>
+                <a:ext cx="4680" cy="360"/>
+              </p14:xfrm>
+            </p:contentPart>
+          </mc:Choice>
+          <mc:Fallback>
+            <p:pic>
+              <p:nvPicPr>
+                <p:cNvPr id="9" name="Ink 8">
+                  <a:extLst>
+                    <a:ext uri="{FF2B5EF4-FFF2-40B4-BE49-F238E27FC236}">
+                      <a16:creationId xmlns:a16="http://schemas.microsoft.com/office/drawing/2014/main" id="{3FBCFF8B-2DFE-4208-8DD2-B28957F4FF96}"/>
+                    </a:ext>
+                  </a:extLst>
+                </p:cNvPr>
+                <p:cNvPicPr/>
+                <p:nvPr/>
+              </p:nvPicPr>
+              <p:blipFill>
+                <a:blip r:embed="rId3"/>
+                <a:stretch>
+                  <a:fillRect/>
+                </a:stretch>
+              </p:blipFill>
+              <p:spPr>
+                <a:xfrm>
+                  <a:off x="5551778" y="3660116"/>
+                  <a:ext cx="22320" cy="18000"/>
+                </a:xfrm>
+                <a:prstGeom prst="rect">
+                  <a:avLst/>
+                </a:prstGeom>
+              </p:spPr>
+            </p:pic>
+          </mc:Fallback>
+        </mc:AlternateContent>
+        <mc:AlternateContent xmlns:mc="http://schemas.openxmlformats.org/markup-compatibility/2006">
+          <mc:Choice xmlns:p14="http://schemas.microsoft.com/office/powerpoint/2010/main" Requires="p14">
+            <p:contentPart p14:bwMode="auto" r:id="rId9">
+              <p14:nvContentPartPr>
+                <p14:cNvPr id="10" name="Ink 9">
+                  <a:extLst>
+                    <a:ext uri="{FF2B5EF4-FFF2-40B4-BE49-F238E27FC236}">
+                      <a16:creationId xmlns:a16="http://schemas.microsoft.com/office/drawing/2014/main" id="{908B74ED-F957-4A31-84B6-A702485C2AF4}"/>
+                    </a:ext>
+                  </a:extLst>
+                </p14:cNvPr>
+                <p14:cNvContentPartPr/>
+                <p14:nvPr/>
+              </p14:nvContentPartPr>
+              <p14:xfrm>
+                <a:off x="5542418" y="3668756"/>
+                <a:ext cx="360" cy="360"/>
+              </p14:xfrm>
+            </p:contentPart>
+          </mc:Choice>
+          <mc:Fallback>
+            <p:pic>
+              <p:nvPicPr>
+                <p:cNvPr id="10" name="Ink 9">
+                  <a:extLst>
+                    <a:ext uri="{FF2B5EF4-FFF2-40B4-BE49-F238E27FC236}">
+                      <a16:creationId xmlns:a16="http://schemas.microsoft.com/office/drawing/2014/main" id="{908B74ED-F957-4A31-84B6-A702485C2AF4}"/>
+                    </a:ext>
+                  </a:extLst>
+                </p:cNvPr>
+                <p:cNvPicPr/>
+                <p:nvPr/>
+              </p:nvPicPr>
+              <p:blipFill>
+                <a:blip r:embed="rId3"/>
+                <a:stretch>
+                  <a:fillRect/>
+                </a:stretch>
+              </p:blipFill>
+              <p:spPr>
+                <a:xfrm>
+                  <a:off x="5533778" y="3660116"/>
+                  <a:ext cx="18000" cy="18000"/>
+                </a:xfrm>
+                <a:prstGeom prst="rect">
+                  <a:avLst/>
+                </a:prstGeom>
+              </p:spPr>
+            </p:pic>
+          </mc:Fallback>
+        </mc:AlternateContent>
+      </p:grpSp>
+      <mc:AlternateContent xmlns:mc="http://schemas.openxmlformats.org/markup-compatibility/2006">
+        <mc:Choice xmlns:p14="http://schemas.microsoft.com/office/powerpoint/2010/main" Requires="p14">
+          <p:contentPart p14:bwMode="auto" r:id="rId10">
+            <p14:nvContentPartPr>
+              <p14:cNvPr id="11" name="Ink 10">
+                <a:extLst>
+                  <a:ext uri="{FF2B5EF4-FFF2-40B4-BE49-F238E27FC236}">
+                    <a16:creationId xmlns:a16="http://schemas.microsoft.com/office/drawing/2014/main" id="{2A80803F-71DF-408E-99C0-362CFD121EF7}"/>
+                  </a:ext>
+                </a:extLst>
+              </p14:cNvPr>
+              <p14:cNvContentPartPr/>
+              <p14:nvPr/>
+            </p14:nvContentPartPr>
+            <p14:xfrm>
+              <a:off x="6429818" y="3775676"/>
+              <a:ext cx="4680" cy="152640"/>
+            </p14:xfrm>
+          </p:contentPart>
+        </mc:Choice>
+        <mc:Fallback>
+          <p:pic>
+            <p:nvPicPr>
+              <p:cNvPr id="11" name="Ink 10">
+                <a:extLst>
+                  <a:ext uri="{FF2B5EF4-FFF2-40B4-BE49-F238E27FC236}">
+                    <a16:creationId xmlns:a16="http://schemas.microsoft.com/office/drawing/2014/main" id="{2A80803F-71DF-408E-99C0-362CFD121EF7}"/>
+                  </a:ext>
+                </a:extLst>
+              </p:cNvPr>
+              <p:cNvPicPr/>
+              <p:nvPr/>
+            </p:nvPicPr>
+            <p:blipFill>
+              <a:blip r:embed="rId11"/>
+              <a:stretch>
+                <a:fillRect/>
+              </a:stretch>
+            </p:blipFill>
+            <p:spPr>
+              <a:xfrm>
+                <a:off x="6420818" y="3767036"/>
+                <a:ext cx="22320" cy="170280"/>
+              </a:xfrm>
+              <a:prstGeom prst="rect">
+                <a:avLst/>
+              </a:prstGeom>
+            </p:spPr>
+          </p:pic>
+        </mc:Fallback>
+      </mc:AlternateContent>
+      <mc:AlternateContent xmlns:mc="http://schemas.openxmlformats.org/markup-compatibility/2006">
+        <mc:Choice xmlns:p14="http://schemas.microsoft.com/office/powerpoint/2010/main" Requires="p14">
+          <p:contentPart p14:bwMode="auto" r:id="rId12">
+            <p14:nvContentPartPr>
+              <p14:cNvPr id="12" name="Ink 11">
+                <a:extLst>
+                  <a:ext uri="{FF2B5EF4-FFF2-40B4-BE49-F238E27FC236}">
+                    <a16:creationId xmlns:a16="http://schemas.microsoft.com/office/drawing/2014/main" id="{8BDC6F77-2737-4C89-94F3-1A0106B4D7F6}"/>
+                  </a:ext>
+                </a:extLst>
+              </p14:cNvPr>
+              <p14:cNvContentPartPr/>
+              <p14:nvPr/>
+            </p14:nvContentPartPr>
+            <p14:xfrm>
+              <a:off x="6366818" y="2234876"/>
+              <a:ext cx="360" cy="360"/>
+            </p14:xfrm>
+          </p:contentPart>
+        </mc:Choice>
+        <mc:Fallback>
+          <p:pic>
+            <p:nvPicPr>
+              <p:cNvPr id="12" name="Ink 11">
+                <a:extLst>
+                  <a:ext uri="{FF2B5EF4-FFF2-40B4-BE49-F238E27FC236}">
+                    <a16:creationId xmlns:a16="http://schemas.microsoft.com/office/drawing/2014/main" id="{8BDC6F77-2737-4C89-94F3-1A0106B4D7F6}"/>
+                  </a:ext>
+                </a:extLst>
+              </p:cNvPr>
+              <p:cNvPicPr/>
+              <p:nvPr/>
+            </p:nvPicPr>
+            <p:blipFill>
+              <a:blip r:embed="rId3"/>
+              <a:stretch>
+                <a:fillRect/>
+              </a:stretch>
+            </p:blipFill>
+            <p:spPr>
+              <a:xfrm>
+                <a:off x="6357818" y="2225876"/>
+                <a:ext cx="18000" cy="18000"/>
+              </a:xfrm>
+              <a:prstGeom prst="rect">
+                <a:avLst/>
+              </a:prstGeom>
+            </p:spPr>
+          </p:pic>
+        </mc:Fallback>
+      </mc:AlternateContent>
+      <mc:AlternateContent xmlns:mc="http://schemas.openxmlformats.org/markup-compatibility/2006">
+        <mc:Choice xmlns:p14="http://schemas.microsoft.com/office/powerpoint/2010/main" Requires="p14">
+          <p:contentPart p14:bwMode="auto" r:id="rId13">
+            <p14:nvContentPartPr>
+              <p14:cNvPr id="13" name="Ink 12">
+                <a:extLst>
+                  <a:ext uri="{FF2B5EF4-FFF2-40B4-BE49-F238E27FC236}">
+                    <a16:creationId xmlns:a16="http://schemas.microsoft.com/office/drawing/2014/main" id="{76902B9D-A858-4937-90EC-173E123945A9}"/>
+                  </a:ext>
+                </a:extLst>
+              </p14:cNvPr>
+              <p14:cNvContentPartPr/>
+              <p14:nvPr/>
+            </p14:nvContentPartPr>
+            <p14:xfrm>
+              <a:off x="6061538" y="2697476"/>
+              <a:ext cx="360" cy="360"/>
+            </p14:xfrm>
+          </p:contentPart>
+        </mc:Choice>
+        <mc:Fallback>
+          <p:pic>
+            <p:nvPicPr>
+              <p:cNvPr id="13" name="Ink 12">
+                <a:extLst>
+                  <a:ext uri="{FF2B5EF4-FFF2-40B4-BE49-F238E27FC236}">
+                    <a16:creationId xmlns:a16="http://schemas.microsoft.com/office/drawing/2014/main" id="{76902B9D-A858-4937-90EC-173E123945A9}"/>
+                  </a:ext>
+                </a:extLst>
+              </p:cNvPr>
+              <p:cNvPicPr/>
+              <p:nvPr/>
+            </p:nvPicPr>
+            <p:blipFill>
+              <a:blip r:embed="rId3"/>
+              <a:stretch>
+                <a:fillRect/>
+              </a:stretch>
+            </p:blipFill>
+            <p:spPr>
+              <a:xfrm>
+                <a:off x="6052898" y="2688836"/>
+                <a:ext cx="18000" cy="18000"/>
               </a:xfrm>
               <a:prstGeom prst="rect">
                 <a:avLst/>

</xml_diff>